<commit_message>
Powerpoint added to scratch
</commit_message>
<xml_diff>
--- a/scratch/ASMPresentation.pptx
+++ b/scratch/ASMPresentation.pptx
@@ -3116,12 +3116,12 @@
           <a:lstStyle/>
           <a:p>
             <a:r>
-              <a:rPr lang="en-US" b="1" i="1" dirty="0" smtClean="0"/>
+              <a:rPr lang="en-US" b="1" i="1" smtClean="0"/>
               <a:t>B</a:t>
             </a:r>
             <a:r>
-              <a:rPr lang="en-US" dirty="0" smtClean="0"/>
-              <a:t>***** CPU</a:t>
+              <a:rPr lang="en-US" smtClean="0"/>
+              <a:t>CPU</a:t>
             </a:r>
             <a:endParaRPr lang="en-US" dirty="0"/>
           </a:p>

</xml_diff>